<commit_message>
removed zip. uploaded direct project folders
</commit_message>
<xml_diff>
--- a/pod3 ppt.pptx
+++ b/pod3 ppt.pptx
@@ -5951,7 +5951,7 @@
           </a:pPr>
           <a:r>
             <a:rPr lang="en-US" dirty="0"/>
-            <a:t>The project is aimed at helping the insurance company, insurer and surveyor to register, settle the claim and generate the report to observe and check the management of insurance company.</a:t>
+            <a:t>The project is aimed at helping the insurance company, insurer and surveyor to register a claim, settle the claim and generate the report to observe and check the management of insurance company.</a:t>
           </a:r>
         </a:p>
       </dgm:t>
@@ -8077,7 +8077,7 @@
         </a:bodyPr>
         <a:lstStyle/>
         <a:p>
-          <a:pPr marL="0" lvl="0" indent="0" algn="ctr" defTabSz="844550">
+          <a:pPr marL="0" lvl="0" indent="0" algn="ctr" defTabSz="711200">
             <a:lnSpc>
               <a:spcPct val="100000"/>
             </a:lnSpc>
@@ -8090,8 +8090,8 @@
             <a:buNone/>
           </a:pPr>
           <a:r>
-            <a:rPr lang="en-US" sz="1900" kern="1200" dirty="0"/>
-            <a:t>The project is aimed at helping the insurance company, insurer and surveyor to register, settle the claim and generate the report to observe and check the management of insurance company.</a:t>
+            <a:rPr lang="en-US" sz="1600" kern="1200" dirty="0"/>
+            <a:t>The project is aimed at helping the insurance company, insurer and surveyor to register a claim, settle the claim and generate the report to observe and check the management of insurance company.</a:t>
           </a:r>
         </a:p>
       </dsp:txBody>
@@ -17228,7 +17228,7 @@
           <a:p>
             <a:fld id="{E3C092FF-84C5-4D17-9804-A220705B1587}" type="datetimeFigureOut">
               <a:rPr lang="en-US" smtClean="0"/>
-              <a:t>4/26/2023</a:t>
+              <a:t>4/27/2023</a:t>
             </a:fld>
             <a:endParaRPr lang="en-US"/>
           </a:p>
@@ -17695,7 +17695,7 @@
           <a:p>
             <a:fld id="{9F7E77FC-7C86-40FD-9419-4A06617ED639}" type="datetime1">
               <a:rPr lang="en-US" smtClean="0"/>
-              <a:t>4/26/2023</a:t>
+              <a:t>4/27/2023</a:t>
             </a:fld>
             <a:endParaRPr lang="en-US"/>
           </a:p>
@@ -17888,7 +17888,7 @@
           <a:p>
             <a:fld id="{43DA1A14-70FC-418A-9615-559F3F36F2D3}" type="datetime1">
               <a:rPr lang="en-US" smtClean="0"/>
-              <a:t>4/26/2023</a:t>
+              <a:t>4/27/2023</a:t>
             </a:fld>
             <a:endParaRPr lang="en-US"/>
           </a:p>
@@ -18071,7 +18071,7 @@
           <a:p>
             <a:fld id="{07AFC261-0D65-4E81-9862-EC317057075F}" type="datetime1">
               <a:rPr lang="en-US" smtClean="0"/>
-              <a:t>4/26/2023</a:t>
+              <a:t>4/27/2023</a:t>
             </a:fld>
             <a:endParaRPr lang="en-US"/>
           </a:p>
@@ -18244,7 +18244,7 @@
           <a:p>
             <a:fld id="{3D57020B-A000-487C-AD93-B47E270619EB}" type="datetime1">
               <a:rPr lang="en-US" smtClean="0"/>
-              <a:t>4/26/2023</a:t>
+              <a:t>4/27/2023</a:t>
             </a:fld>
             <a:endParaRPr lang="en-US"/>
           </a:p>
@@ -18503,7 +18503,7 @@
           <a:p>
             <a:fld id="{04DDD993-8670-4FC8-98F0-53B4747D2855}" type="datetime1">
               <a:rPr lang="en-US" smtClean="0"/>
-              <a:t>4/26/2023</a:t>
+              <a:t>4/27/2023</a:t>
             </a:fld>
             <a:endParaRPr lang="en-US"/>
           </a:p>
@@ -18794,7 +18794,7 @@
           <a:p>
             <a:fld id="{B1BBC6EC-9A1D-4783-A140-3F537E7427A2}" type="datetime1">
               <a:rPr lang="en-US" smtClean="0"/>
-              <a:t>4/26/2023</a:t>
+              <a:t>4/27/2023</a:t>
             </a:fld>
             <a:endParaRPr lang="en-US"/>
           </a:p>
@@ -19235,7 +19235,7 @@
           <a:p>
             <a:fld id="{CDF320F3-1291-4754-B071-9CB918872E3B}" type="datetime1">
               <a:rPr lang="en-US" smtClean="0"/>
-              <a:t>4/26/2023</a:t>
+              <a:t>4/27/2023</a:t>
             </a:fld>
             <a:endParaRPr lang="en-US"/>
           </a:p>
@@ -19356,7 +19356,7 @@
           <a:p>
             <a:fld id="{9359926E-58E6-4DFD-898E-47EE37C01B81}" type="datetime1">
               <a:rPr lang="en-US" smtClean="0"/>
-              <a:t>4/26/2023</a:t>
+              <a:t>4/27/2023</a:t>
             </a:fld>
             <a:endParaRPr lang="en-US"/>
           </a:p>
@@ -19454,7 +19454,7 @@
           <a:p>
             <a:fld id="{8FB73F1D-B7FC-4007-B12F-404DD6E94042}" type="datetime1">
               <a:rPr lang="en-US" smtClean="0"/>
-              <a:t>4/26/2023</a:t>
+              <a:t>4/27/2023</a:t>
             </a:fld>
             <a:endParaRPr lang="en-US"/>
           </a:p>
@@ -19813,7 +19813,7 @@
           <a:p>
             <a:fld id="{D355621D-8863-45E7-A3AC-E9DD90E6F923}" type="datetime1">
               <a:rPr lang="en-US" smtClean="0"/>
-              <a:t>4/26/2023</a:t>
+              <a:t>4/27/2023</a:t>
             </a:fld>
             <a:endParaRPr lang="en-US"/>
           </a:p>
@@ -20132,7 +20132,7 @@
           <a:p>
             <a:fld id="{17CDAF9A-443F-48EA-9536-D20E427AEE1F}" type="datetime1">
               <a:rPr lang="en-US" smtClean="0"/>
-              <a:t>4/26/2023</a:t>
+              <a:t>4/27/2023</a:t>
             </a:fld>
             <a:endParaRPr lang="en-US"/>
           </a:p>
@@ -20368,7 +20368,7 @@
           <a:p>
             <a:fld id="{E1E5E42A-DF13-4F76-919F-216FF8F3F4D3}" type="datetime1">
               <a:rPr lang="en-US" smtClean="0"/>
-              <a:t>4/26/2023</a:t>
+              <a:t>4/27/2023</a:t>
             </a:fld>
             <a:endParaRPr lang="en-US"/>
           </a:p>
@@ -24657,7 +24657,7 @@
           <p:nvPr>
             <p:extLst>
               <p:ext uri="{D42A27DB-BD31-4B8C-83A1-F6EECF244321}">
-                <p14:modId xmlns:p14="http://schemas.microsoft.com/office/powerpoint/2010/main" val="3372132937"/>
+                <p14:modId xmlns:p14="http://schemas.microsoft.com/office/powerpoint/2010/main" val="1465324830"/>
               </p:ext>
             </p:extLst>
           </p:nvPr>
@@ -27207,9 +27207,10 @@
           </a:p>
           <a:p>
             <a:r>
-              <a:rPr lang="en-US" dirty="0"/>
-              <a:t>Junit and Mockito</a:t>
+              <a:rPr lang="en-US"/>
+              <a:t>Junit</a:t>
             </a:r>
+            <a:endParaRPr lang="en-US" dirty="0"/>
           </a:p>
           <a:p>
             <a:r>

</xml_diff>